<commit_message>
Added images references and whoAmI to slides
</commit_message>
<xml_diff>
--- a/CQRS 1O1.pptx
+++ b/CQRS 1O1.pptx
@@ -5,7 +5,7 @@
     <p:sldMasterId id="2147483648" r:id="rId1"/>
   </p:sldMasterIdLst>
   <p:notesMasterIdLst>
-    <p:notesMasterId r:id="rId21"/>
+    <p:notesMasterId r:id="rId23"/>
   </p:notesMasterIdLst>
   <p:sldIdLst>
     <p:sldId id="256" r:id="rId2"/>
@@ -27,6 +27,8 @@
     <p:sldId id="274" r:id="rId18"/>
     <p:sldId id="277" r:id="rId19"/>
     <p:sldId id="284" r:id="rId20"/>
+    <p:sldId id="285" r:id="rId21"/>
+    <p:sldId id="286" r:id="rId22"/>
   </p:sldIdLst>
   <p:sldSz cx="12192000" cy="6858000"/>
   <p:notesSz cx="6858000" cy="9144000"/>
@@ -8555,6 +8557,278 @@
     <p:extLst>
       <p:ext uri="{BB962C8B-B14F-4D97-AF65-F5344CB8AC3E}">
         <p14:creationId xmlns:p14="http://schemas.microsoft.com/office/powerpoint/2010/main" val="3179369825"/>
+      </p:ext>
+    </p:extLst>
+  </p:cSld>
+  <p:clrMapOvr>
+    <a:masterClrMapping/>
+  </p:clrMapOvr>
+</p:sld>
+</file>
+
+<file path=ppt/slides/slide20.xml><?xml version="1.0" encoding="utf-8"?>
+<p:sld xmlns:a="http://schemas.openxmlformats.org/drawingml/2006/main" xmlns:r="http://schemas.openxmlformats.org/officeDocument/2006/relationships" xmlns:p="http://schemas.openxmlformats.org/presentationml/2006/main">
+  <p:cSld>
+    <p:spTree>
+      <p:nvGrpSpPr>
+        <p:cNvPr id="1" name=""/>
+        <p:cNvGrpSpPr/>
+        <p:nvPr/>
+      </p:nvGrpSpPr>
+      <p:grpSpPr>
+        <a:xfrm>
+          <a:off x="0" y="0"/>
+          <a:ext cx="0" cy="0"/>
+          <a:chOff x="0" y="0"/>
+          <a:chExt cx="0" cy="0"/>
+        </a:xfrm>
+      </p:grpSpPr>
+      <p:pic>
+        <p:nvPicPr>
+          <p:cNvPr id="4" name="Picture 3">
+            <a:extLst>
+              <a:ext uri="{FF2B5EF4-FFF2-40B4-BE49-F238E27FC236}">
+                <a16:creationId xmlns:a16="http://schemas.microsoft.com/office/drawing/2014/main" id="{3A6987EF-A05C-4E21-8B30-21BE13F6444D}"/>
+              </a:ext>
+            </a:extLst>
+          </p:cNvPr>
+          <p:cNvPicPr>
+            <a:picLocks noChangeAspect="1"/>
+          </p:cNvPicPr>
+          <p:nvPr/>
+        </p:nvPicPr>
+        <p:blipFill>
+          <a:blip r:embed="rId2"/>
+          <a:stretch>
+            <a:fillRect/>
+          </a:stretch>
+        </p:blipFill>
+        <p:spPr>
+          <a:xfrm>
+            <a:off x="487291" y="685801"/>
+            <a:ext cx="10917023" cy="4821148"/>
+          </a:xfrm>
+          <a:prstGeom prst="rect">
+            <a:avLst/>
+          </a:prstGeom>
+        </p:spPr>
+      </p:pic>
+      <p:sp>
+        <p:nvSpPr>
+          <p:cNvPr id="2" name="Title 1">
+            <a:extLst>
+              <a:ext uri="{FF2B5EF4-FFF2-40B4-BE49-F238E27FC236}">
+                <a16:creationId xmlns:a16="http://schemas.microsoft.com/office/drawing/2014/main" id="{8FA9AFB0-0795-4F4E-91D6-B34E1F103877}"/>
+              </a:ext>
+            </a:extLst>
+          </p:cNvPr>
+          <p:cNvSpPr>
+            <a:spLocks noGrp="1"/>
+          </p:cNvSpPr>
+          <p:nvPr>
+            <p:ph type="title"/>
+          </p:nvPr>
+        </p:nvSpPr>
+        <p:spPr/>
+        <p:txBody>
+          <a:bodyPr/>
+          <a:lstStyle/>
+          <a:p>
+            <a:r>
+              <a:rPr lang="en-US" dirty="0"/>
+              <a:t>Reference</a:t>
+            </a:r>
+          </a:p>
+        </p:txBody>
+      </p:sp>
+      <p:sp>
+        <p:nvSpPr>
+          <p:cNvPr id="3" name="Content Placeholder 2">
+            <a:extLst>
+              <a:ext uri="{FF2B5EF4-FFF2-40B4-BE49-F238E27FC236}">
+                <a16:creationId xmlns:a16="http://schemas.microsoft.com/office/drawing/2014/main" id="{91F587D3-0751-4269-9409-CADB06CCBE81}"/>
+              </a:ext>
+            </a:extLst>
+          </p:cNvPr>
+          <p:cNvSpPr>
+            <a:spLocks noGrp="1"/>
+          </p:cNvSpPr>
+          <p:nvPr>
+            <p:ph sz="quarter" idx="13"/>
+          </p:nvPr>
+        </p:nvSpPr>
+        <p:spPr/>
+        <p:txBody>
+          <a:bodyPr/>
+          <a:lstStyle/>
+          <a:p>
+            <a:r>
+              <a:rPr lang="en-US" dirty="0"/>
+              <a:t>Eric Evans, Domain-Driven Design, Addison-Wesley, 2003</a:t>
+            </a:r>
+          </a:p>
+          <a:p>
+            <a:r>
+              <a:rPr lang="en-US" dirty="0"/>
+              <a:t>Jimmy Nilsson, Applying Domain-Driven Design and Patterns, Pearson, 2006</a:t>
+            </a:r>
+          </a:p>
+          <a:p>
+            <a:r>
+              <a:rPr lang="en-US" dirty="0"/>
+              <a:t>Vaughn Vernon, Implementing Domain Driven Design, Pearson, 2013</a:t>
+            </a:r>
+          </a:p>
+          <a:p>
+            <a:r>
+              <a:rPr lang="en-US" dirty="0"/>
+              <a:t>Martin </a:t>
+            </a:r>
+            <a:r>
+              <a:rPr lang="en-US" dirty="0" err="1"/>
+              <a:t>Folwer</a:t>
+            </a:r>
+            <a:r>
+              <a:rPr lang="en-US" dirty="0"/>
+              <a:t>, https://martinfowler.com/</a:t>
+            </a:r>
+          </a:p>
+          <a:p>
+            <a:r>
+              <a:rPr lang="en-US" dirty="0"/>
+              <a:t>Jimmy </a:t>
+            </a:r>
+            <a:r>
+              <a:rPr lang="en-US" dirty="0" err="1"/>
+              <a:t>Bogard</a:t>
+            </a:r>
+            <a:r>
+              <a:rPr lang="en-US" dirty="0"/>
+              <a:t>, https://jimmybogard.com/</a:t>
+            </a:r>
+          </a:p>
+        </p:txBody>
+      </p:sp>
+    </p:spTree>
+    <p:extLst>
+      <p:ext uri="{BB962C8B-B14F-4D97-AF65-F5344CB8AC3E}">
+        <p14:creationId xmlns:p14="http://schemas.microsoft.com/office/powerpoint/2010/main" val="3243707582"/>
+      </p:ext>
+    </p:extLst>
+  </p:cSld>
+  <p:clrMapOvr>
+    <a:masterClrMapping/>
+  </p:clrMapOvr>
+</p:sld>
+</file>
+
+<file path=ppt/slides/slide21.xml><?xml version="1.0" encoding="utf-8"?>
+<p:sld xmlns:a="http://schemas.openxmlformats.org/drawingml/2006/main" xmlns:r="http://schemas.openxmlformats.org/officeDocument/2006/relationships" xmlns:p="http://schemas.openxmlformats.org/presentationml/2006/main">
+  <p:cSld>
+    <p:spTree>
+      <p:nvGrpSpPr>
+        <p:cNvPr id="1" name=""/>
+        <p:cNvGrpSpPr/>
+        <p:nvPr/>
+      </p:nvGrpSpPr>
+      <p:grpSpPr>
+        <a:xfrm>
+          <a:off x="0" y="0"/>
+          <a:ext cx="0" cy="0"/>
+          <a:chOff x="0" y="0"/>
+          <a:chExt cx="0" cy="0"/>
+        </a:xfrm>
+      </p:grpSpPr>
+      <p:sp>
+        <p:nvSpPr>
+          <p:cNvPr id="2" name="Title 1">
+            <a:extLst>
+              <a:ext uri="{FF2B5EF4-FFF2-40B4-BE49-F238E27FC236}">
+                <a16:creationId xmlns:a16="http://schemas.microsoft.com/office/drawing/2014/main" id="{8FA9AFB0-0795-4F4E-91D6-B34E1F103877}"/>
+              </a:ext>
+            </a:extLst>
+          </p:cNvPr>
+          <p:cNvSpPr>
+            <a:spLocks noGrp="1"/>
+          </p:cNvSpPr>
+          <p:nvPr>
+            <p:ph type="title"/>
+          </p:nvPr>
+        </p:nvSpPr>
+        <p:spPr/>
+        <p:txBody>
+          <a:bodyPr/>
+          <a:lstStyle/>
+          <a:p>
+            <a:r>
+              <a:rPr lang="en-US" dirty="0"/>
+              <a:t>Thank you for your time</a:t>
+            </a:r>
+          </a:p>
+        </p:txBody>
+      </p:sp>
+      <p:sp>
+        <p:nvSpPr>
+          <p:cNvPr id="3" name="Content Placeholder 2">
+            <a:extLst>
+              <a:ext uri="{FF2B5EF4-FFF2-40B4-BE49-F238E27FC236}">
+                <a16:creationId xmlns:a16="http://schemas.microsoft.com/office/drawing/2014/main" id="{91F587D3-0751-4269-9409-CADB06CCBE81}"/>
+              </a:ext>
+            </a:extLst>
+          </p:cNvPr>
+          <p:cNvSpPr>
+            <a:spLocks noGrp="1"/>
+          </p:cNvSpPr>
+          <p:nvPr>
+            <p:ph sz="quarter" idx="13"/>
+          </p:nvPr>
+        </p:nvSpPr>
+        <p:spPr/>
+        <p:txBody>
+          <a:bodyPr/>
+          <a:lstStyle/>
+          <a:p>
+            <a:r>
+              <a:rPr lang="it-IT" dirty="0"/>
+              <a:t>Enrico Da Ros:</a:t>
+            </a:r>
+          </a:p>
+          <a:p>
+            <a:pPr lvl="1"/>
+            <a:r>
+              <a:rPr lang="it-IT" dirty="0"/>
+              <a:t>E-mail: edr@kendar.org</a:t>
+            </a:r>
+          </a:p>
+          <a:p>
+            <a:pPr lvl="1"/>
+            <a:r>
+              <a:rPr lang="it-IT" dirty="0"/>
+              <a:t>Linkedin: https://www.linkedin.com/in/enricodaros/</a:t>
+            </a:r>
+          </a:p>
+          <a:p>
+            <a:pPr lvl="1"/>
+            <a:r>
+              <a:rPr lang="it-IT" dirty="0"/>
+              <a:t>Slides </a:t>
+            </a:r>
+            <a:r>
+              <a:rPr lang="it-IT"/>
+              <a:t>and code: </a:t>
+            </a:r>
+            <a:r>
+              <a:rPr lang="it-IT" dirty="0"/>
+              <a:t>https://github.com/kendarorg/CQRS101</a:t>
+            </a:r>
+            <a:endParaRPr lang="en-US" dirty="0"/>
+          </a:p>
+        </p:txBody>
+      </p:sp>
+    </p:spTree>
+    <p:extLst>
+      <p:ext uri="{BB962C8B-B14F-4D97-AF65-F5344CB8AC3E}">
+        <p14:creationId xmlns:p14="http://schemas.microsoft.com/office/powerpoint/2010/main" val="1382476607"/>
       </p:ext>
     </p:extLst>
   </p:cSld>

</xml_diff>

<commit_message>
Updated to remove some warning and unused code
</commit_message>
<xml_diff>
--- a/CQRS 1O1.pptx
+++ b/CQRS 1O1.pptx
@@ -5,7 +5,7 @@
     <p:sldMasterId id="2147483648" r:id="rId1"/>
   </p:sldMasterIdLst>
   <p:notesMasterIdLst>
-    <p:notesMasterId r:id="rId23"/>
+    <p:notesMasterId r:id="rId24"/>
   </p:notesMasterIdLst>
   <p:sldIdLst>
     <p:sldId id="256" r:id="rId2"/>
@@ -27,8 +27,9 @@
     <p:sldId id="274" r:id="rId18"/>
     <p:sldId id="277" r:id="rId19"/>
     <p:sldId id="284" r:id="rId20"/>
-    <p:sldId id="285" r:id="rId21"/>
-    <p:sldId id="286" r:id="rId22"/>
+    <p:sldId id="287" r:id="rId21"/>
+    <p:sldId id="285" r:id="rId22"/>
+    <p:sldId id="286" r:id="rId23"/>
   </p:sldIdLst>
   <p:sldSz cx="12192000" cy="6858000"/>
   <p:notesSz cx="6858000" cy="9144000"/>
@@ -8122,6 +8123,12 @@
             </a:r>
           </a:p>
           <a:p>
+            <a:r>
+              <a:rPr lang="en-US" dirty="0"/>
+              <a:t>This is a “saga”</a:t>
+            </a:r>
+          </a:p>
+          <a:p>
             <a:endParaRPr lang="en-US" dirty="0"/>
           </a:p>
         </p:txBody>
@@ -8414,7 +8421,7 @@
           <a:p>
             <a:r>
               <a:rPr lang="en-US" dirty="0"/>
-              <a:t>NOW the red pill</a:t>
+              <a:t>CQRS-04, the red pill</a:t>
             </a:r>
           </a:p>
         </p:txBody>
@@ -8567,6 +8574,194 @@
 </file>
 
 <file path=ppt/slides/slide20.xml><?xml version="1.0" encoding="utf-8"?>
+<p:sld xmlns:a="http://schemas.openxmlformats.org/drawingml/2006/main" xmlns:r="http://schemas.openxmlformats.org/officeDocument/2006/relationships" xmlns:p="http://schemas.openxmlformats.org/presentationml/2006/main">
+  <p:cSld>
+    <p:spTree>
+      <p:nvGrpSpPr>
+        <p:cNvPr id="1" name=""/>
+        <p:cNvGrpSpPr/>
+        <p:nvPr/>
+      </p:nvGrpSpPr>
+      <p:grpSpPr>
+        <a:xfrm>
+          <a:off x="0" y="0"/>
+          <a:ext cx="0" cy="0"/>
+          <a:chOff x="0" y="0"/>
+          <a:chExt cx="0" cy="0"/>
+        </a:xfrm>
+      </p:grpSpPr>
+      <p:sp>
+        <p:nvSpPr>
+          <p:cNvPr id="2" name="Title 1">
+            <a:extLst>
+              <a:ext uri="{FF2B5EF4-FFF2-40B4-BE49-F238E27FC236}">
+                <a16:creationId xmlns:a16="http://schemas.microsoft.com/office/drawing/2014/main" id="{4E2422FC-F0E0-4987-B5CB-7E74142A131F}"/>
+              </a:ext>
+            </a:extLst>
+          </p:cNvPr>
+          <p:cNvSpPr>
+            <a:spLocks noGrp="1"/>
+          </p:cNvSpPr>
+          <p:nvPr>
+            <p:ph type="title"/>
+          </p:nvPr>
+        </p:nvSpPr>
+        <p:spPr/>
+        <p:txBody>
+          <a:bodyPr/>
+          <a:lstStyle/>
+          <a:p>
+            <a:r>
+              <a:rPr lang="en-US" dirty="0" err="1"/>
+              <a:t>nservicebus</a:t>
+            </a:r>
+            <a:endParaRPr lang="en-US" dirty="0"/>
+          </a:p>
+        </p:txBody>
+      </p:sp>
+      <p:sp>
+        <p:nvSpPr>
+          <p:cNvPr id="3" name="Content Placeholder 2">
+            <a:extLst>
+              <a:ext uri="{FF2B5EF4-FFF2-40B4-BE49-F238E27FC236}">
+                <a16:creationId xmlns:a16="http://schemas.microsoft.com/office/drawing/2014/main" id="{7A3B5BB5-1111-43E4-83E8-D42BC726EBEC}"/>
+              </a:ext>
+            </a:extLst>
+          </p:cNvPr>
+          <p:cNvSpPr>
+            <a:spLocks noGrp="1"/>
+          </p:cNvSpPr>
+          <p:nvPr>
+            <p:ph sz="quarter" idx="13"/>
+          </p:nvPr>
+        </p:nvSpPr>
+        <p:spPr/>
+        <p:txBody>
+          <a:bodyPr/>
+          <a:lstStyle/>
+          <a:p>
+            <a:r>
+              <a:rPr lang="en-US" dirty="0"/>
+              <a:t>Real service bus</a:t>
+            </a:r>
+          </a:p>
+          <a:p>
+            <a:r>
+              <a:rPr lang="en-US" dirty="0"/>
+              <a:t>Can send delayed messages</a:t>
+            </a:r>
+          </a:p>
+          <a:p>
+            <a:r>
+              <a:rPr lang="en-US" dirty="0"/>
+              <a:t>Can handle sagas</a:t>
+            </a:r>
+          </a:p>
+          <a:p>
+            <a:r>
+              <a:rPr lang="en-US" dirty="0"/>
+              <a:t>Automatically register the handlers</a:t>
+            </a:r>
+          </a:p>
+          <a:p>
+            <a:r>
+              <a:rPr lang="en-US" dirty="0"/>
+              <a:t>Can be configured to use several transport (e.g. RabbitMQ, SqlServer etc.)</a:t>
+            </a:r>
+          </a:p>
+        </p:txBody>
+      </p:sp>
+      <p:sp>
+        <p:nvSpPr>
+          <p:cNvPr id="4" name="Content Placeholder 3">
+            <a:extLst>
+              <a:ext uri="{FF2B5EF4-FFF2-40B4-BE49-F238E27FC236}">
+                <a16:creationId xmlns:a16="http://schemas.microsoft.com/office/drawing/2014/main" id="{5BA8AA74-73F4-4340-B217-87A96AE213EE}"/>
+              </a:ext>
+            </a:extLst>
+          </p:cNvPr>
+          <p:cNvSpPr>
+            <a:spLocks noGrp="1"/>
+          </p:cNvSpPr>
+          <p:nvPr>
+            <p:ph sz="quarter" idx="14"/>
+          </p:nvPr>
+        </p:nvSpPr>
+        <p:spPr/>
+        <p:txBody>
+          <a:bodyPr/>
+          <a:lstStyle/>
+          <a:p>
+            <a:r>
+              <a:rPr lang="en-US" dirty="0"/>
+              <a:t>We use the default di from .NET CORE</a:t>
+            </a:r>
+          </a:p>
+          <a:p>
+            <a:pPr lvl="1"/>
+            <a:r>
+              <a:rPr lang="en-US" dirty="0"/>
+              <a:t>Registering the repositories</a:t>
+            </a:r>
+          </a:p>
+          <a:p>
+            <a:pPr lvl="1"/>
+            <a:r>
+              <a:rPr lang="en-US" dirty="0"/>
+              <a:t>Configuring the NSB endpoints</a:t>
+            </a:r>
+          </a:p>
+          <a:p>
+            <a:pPr lvl="1"/>
+            <a:r>
+              <a:rPr lang="en-US" dirty="0"/>
+              <a:t>Using the “dev” </a:t>
+            </a:r>
+            <a:r>
+              <a:rPr lang="en-US" dirty="0" err="1"/>
+              <a:t>nsb</a:t>
+            </a:r>
+            <a:r>
+              <a:rPr lang="en-US" dirty="0"/>
+              <a:t> channel</a:t>
+            </a:r>
+          </a:p>
+          <a:p>
+            <a:r>
+              <a:rPr lang="en-US" dirty="0"/>
+              <a:t>An API will be added to request commands</a:t>
+            </a:r>
+          </a:p>
+          <a:p>
+            <a:r>
+              <a:rPr lang="en-US" dirty="0"/>
+              <a:t>A BDD - </a:t>
+            </a:r>
+            <a:r>
+              <a:rPr lang="en-US" dirty="0" err="1"/>
+              <a:t>SpecFlow</a:t>
+            </a:r>
+            <a:r>
+              <a:rPr lang="en-US" dirty="0"/>
+              <a:t> suite is added</a:t>
+            </a:r>
+          </a:p>
+        </p:txBody>
+      </p:sp>
+    </p:spTree>
+    <p:extLst>
+      <p:ext uri="{BB962C8B-B14F-4D97-AF65-F5344CB8AC3E}">
+        <p14:creationId xmlns:p14="http://schemas.microsoft.com/office/powerpoint/2010/main" val="2053167898"/>
+      </p:ext>
+    </p:extLst>
+  </p:cSld>
+  <p:clrMapOvr>
+    <a:masterClrMapping/>
+  </p:clrMapOvr>
+</p:sld>
+</file>
+
+<file path=ppt/slides/slide21.xml><?xml version="1.0" encoding="utf-8"?>
 <p:sld xmlns:a="http://schemas.openxmlformats.org/drawingml/2006/main" xmlns:r="http://schemas.openxmlformats.org/officeDocument/2006/relationships" xmlns:p="http://schemas.openxmlformats.org/presentationml/2006/main">
   <p:cSld>
     <p:spTree>
@@ -8605,7 +8800,7 @@
         </p:blipFill>
         <p:spPr>
           <a:xfrm>
-            <a:off x="487291" y="685801"/>
+            <a:off x="487291" y="638300"/>
             <a:ext cx="10917023" cy="4821148"/>
           </a:xfrm>
           <a:prstGeom prst="rect">
@@ -8636,7 +8831,7 @@
           <a:p>
             <a:r>
               <a:rPr lang="en-US" dirty="0"/>
-              <a:t>Reference</a:t>
+              <a:t>References</a:t>
             </a:r>
           </a:p>
         </p:txBody>
@@ -8677,6 +8872,16 @@
             <a:r>
               <a:rPr lang="en-US" dirty="0"/>
               <a:t>Vaughn Vernon, Implementing Domain Driven Design, Pearson, 2013</a:t>
+            </a:r>
+          </a:p>
+          <a:p>
+            <a:r>
+              <a:rPr lang="en-US" dirty="0" err="1"/>
+              <a:t>NServiceBus</a:t>
+            </a:r>
+            <a:r>
+              <a:rPr lang="en-US" dirty="0"/>
+              <a:t>, https://particular.net/nservicebus</a:t>
             </a:r>
           </a:p>
           <a:p>
@@ -8722,7 +8927,7 @@
 </p:sld>
 </file>
 
-<file path=ppt/slides/slide21.xml><?xml version="1.0" encoding="utf-8"?>
+<file path=ppt/slides/slide22.xml><?xml version="1.0" encoding="utf-8"?>
 <p:sld xmlns:a="http://schemas.openxmlformats.org/drawingml/2006/main" xmlns:r="http://schemas.openxmlformats.org/officeDocument/2006/relationships" xmlns:p="http://schemas.openxmlformats.org/presentationml/2006/main">
   <p:cSld>
     <p:spTree>

</xml_diff>

<commit_message>
Update with real presentation times
</commit_message>
<xml_diff>
--- a/CQRS 1O1.pptx
+++ b/CQRS 1O1.pptx
@@ -218,7 +218,7 @@
           <a:p>
             <a:fld id="{2B6FC5F4-3FE2-4A6C-8522-1CAFE3198BC0}" type="datetimeFigureOut">
               <a:rPr lang="en-US" smtClean="0"/>
-              <a:t>10/28/2019</a:t>
+              <a:t>10/29/2019</a:t>
             </a:fld>
             <a:endParaRPr lang="en-US"/>
           </a:p>
@@ -640,6 +640,14 @@
           <a:bodyPr/>
           <a:lstStyle/>
           <a:p>
+            <a:r>
+              <a:rPr lang="en-US" dirty="0"/>
+              <a:t>Atomic save-&gt;</a:t>
+            </a:r>
+            <a:r>
+              <a:rPr lang="en-US" dirty="0" err="1"/>
+              <a:t>nosql</a:t>
+            </a:r>
             <a:endParaRPr lang="en-US" dirty="0"/>
           </a:p>
         </p:txBody>
@@ -661,7 +669,7 @@
           <a:p>
             <a:fld id="{895FF055-5A44-4782-94B0-07A3C9756D2A}" type="slidenum">
               <a:rPr lang="en-US" smtClean="0"/>
-              <a:t>17</a:t>
+              <a:t>8</a:t>
             </a:fld>
             <a:endParaRPr lang="en-US"/>
           </a:p>
@@ -670,7 +678,7 @@
     </p:spTree>
     <p:extLst>
       <p:ext uri="{BB962C8B-B14F-4D97-AF65-F5344CB8AC3E}">
-        <p14:creationId xmlns:p14="http://schemas.microsoft.com/office/powerpoint/2010/main" val="801425303"/>
+        <p14:creationId xmlns:p14="http://schemas.microsoft.com/office/powerpoint/2010/main" val="731285143"/>
       </p:ext>
     </p:extLst>
   </p:cSld>
@@ -726,6 +734,545 @@
           <a:p>
             <a:r>
               <a:rPr lang="en-US" dirty="0"/>
+              <a:t>No validation but to check if the event is successful</a:t>
+            </a:r>
+          </a:p>
+          <a:p>
+            <a:r>
+              <a:rPr lang="en-US" dirty="0"/>
+              <a:t>Can be at the same time: repo, event handler and API service</a:t>
+            </a:r>
+          </a:p>
+        </p:txBody>
+      </p:sp>
+      <p:sp>
+        <p:nvSpPr>
+          <p:cNvPr id="4" name="Slide Number Placeholder 3"/>
+          <p:cNvSpPr>
+            <a:spLocks noGrp="1"/>
+          </p:cNvSpPr>
+          <p:nvPr>
+            <p:ph type="sldNum" sz="quarter" idx="5"/>
+          </p:nvPr>
+        </p:nvSpPr>
+        <p:spPr/>
+        <p:txBody>
+          <a:bodyPr/>
+          <a:lstStyle/>
+          <a:p>
+            <a:fld id="{895FF055-5A44-4782-94B0-07A3C9756D2A}" type="slidenum">
+              <a:rPr lang="en-US" smtClean="0"/>
+              <a:t>10</a:t>
+            </a:fld>
+            <a:endParaRPr lang="en-US"/>
+          </a:p>
+        </p:txBody>
+      </p:sp>
+    </p:spTree>
+    <p:extLst>
+      <p:ext uri="{BB962C8B-B14F-4D97-AF65-F5344CB8AC3E}">
+        <p14:creationId xmlns:p14="http://schemas.microsoft.com/office/powerpoint/2010/main" val="3606590006"/>
+      </p:ext>
+    </p:extLst>
+  </p:cSld>
+  <p:clrMapOvr>
+    <a:masterClrMapping/>
+  </p:clrMapOvr>
+</p:notes>
+</file>
+
+<file path=ppt/notesSlides/notesSlide4.xml><?xml version="1.0" encoding="utf-8"?>
+<p:notes xmlns:a="http://schemas.openxmlformats.org/drawingml/2006/main" xmlns:r="http://schemas.openxmlformats.org/officeDocument/2006/relationships" xmlns:p="http://schemas.openxmlformats.org/presentationml/2006/main">
+  <p:cSld>
+    <p:spTree>
+      <p:nvGrpSpPr>
+        <p:cNvPr id="1" name=""/>
+        <p:cNvGrpSpPr/>
+        <p:nvPr/>
+      </p:nvGrpSpPr>
+      <p:grpSpPr>
+        <a:xfrm>
+          <a:off x="0" y="0"/>
+          <a:ext cx="0" cy="0"/>
+          <a:chOff x="0" y="0"/>
+          <a:chExt cx="0" cy="0"/>
+        </a:xfrm>
+      </p:grpSpPr>
+      <p:sp>
+        <p:nvSpPr>
+          <p:cNvPr id="2" name="Slide Image Placeholder 1"/>
+          <p:cNvSpPr>
+            <a:spLocks noGrp="1" noRot="1" noChangeAspect="1"/>
+          </p:cNvSpPr>
+          <p:nvPr>
+            <p:ph type="sldImg"/>
+          </p:nvPr>
+        </p:nvSpPr>
+        <p:spPr/>
+      </p:sp>
+      <p:sp>
+        <p:nvSpPr>
+          <p:cNvPr id="3" name="Notes Placeholder 2"/>
+          <p:cNvSpPr>
+            <a:spLocks noGrp="1"/>
+          </p:cNvSpPr>
+          <p:nvPr>
+            <p:ph type="body" idx="1"/>
+          </p:nvPr>
+        </p:nvSpPr>
+        <p:spPr/>
+        <p:txBody>
+          <a:bodyPr/>
+          <a:lstStyle/>
+          <a:p>
+            <a:r>
+              <a:rPr lang="en-US" dirty="0"/>
+              <a:t>As an alternative to delayed messages</a:t>
+            </a:r>
+          </a:p>
+        </p:txBody>
+      </p:sp>
+      <p:sp>
+        <p:nvSpPr>
+          <p:cNvPr id="4" name="Slide Number Placeholder 3"/>
+          <p:cNvSpPr>
+            <a:spLocks noGrp="1"/>
+          </p:cNvSpPr>
+          <p:nvPr>
+            <p:ph type="sldNum" sz="quarter" idx="5"/>
+          </p:nvPr>
+        </p:nvSpPr>
+        <p:spPr/>
+        <p:txBody>
+          <a:bodyPr/>
+          <a:lstStyle/>
+          <a:p>
+            <a:fld id="{895FF055-5A44-4782-94B0-07A3C9756D2A}" type="slidenum">
+              <a:rPr lang="en-US" smtClean="0"/>
+              <a:t>12</a:t>
+            </a:fld>
+            <a:endParaRPr lang="en-US"/>
+          </a:p>
+        </p:txBody>
+      </p:sp>
+    </p:spTree>
+    <p:extLst>
+      <p:ext uri="{BB962C8B-B14F-4D97-AF65-F5344CB8AC3E}">
+        <p14:creationId xmlns:p14="http://schemas.microsoft.com/office/powerpoint/2010/main" val="1160034618"/>
+      </p:ext>
+    </p:extLst>
+  </p:cSld>
+  <p:clrMapOvr>
+    <a:masterClrMapping/>
+  </p:clrMapOvr>
+</p:notes>
+</file>
+
+<file path=ppt/notesSlides/notesSlide5.xml><?xml version="1.0" encoding="utf-8"?>
+<p:notes xmlns:a="http://schemas.openxmlformats.org/drawingml/2006/main" xmlns:r="http://schemas.openxmlformats.org/officeDocument/2006/relationships" xmlns:p="http://schemas.openxmlformats.org/presentationml/2006/main">
+  <p:cSld>
+    <p:spTree>
+      <p:nvGrpSpPr>
+        <p:cNvPr id="1" name=""/>
+        <p:cNvGrpSpPr/>
+        <p:nvPr/>
+      </p:nvGrpSpPr>
+      <p:grpSpPr>
+        <a:xfrm>
+          <a:off x="0" y="0"/>
+          <a:ext cx="0" cy="0"/>
+          <a:chOff x="0" y="0"/>
+          <a:chExt cx="0" cy="0"/>
+        </a:xfrm>
+      </p:grpSpPr>
+      <p:sp>
+        <p:nvSpPr>
+          <p:cNvPr id="2" name="Slide Image Placeholder 1"/>
+          <p:cNvSpPr>
+            <a:spLocks noGrp="1" noRot="1" noChangeAspect="1"/>
+          </p:cNvSpPr>
+          <p:nvPr>
+            <p:ph type="sldImg"/>
+          </p:nvPr>
+        </p:nvSpPr>
+        <p:spPr/>
+      </p:sp>
+      <p:sp>
+        <p:nvSpPr>
+          <p:cNvPr id="3" name="Notes Placeholder 2"/>
+          <p:cNvSpPr>
+            <a:spLocks noGrp="1"/>
+          </p:cNvSpPr>
+          <p:nvPr>
+            <p:ph type="body" idx="1"/>
+          </p:nvPr>
+        </p:nvSpPr>
+        <p:spPr/>
+        <p:txBody>
+          <a:bodyPr/>
+          <a:lstStyle/>
+          <a:p>
+            <a:r>
+              <a:rPr lang="en-US" dirty="0"/>
+              <a:t>Commands, CH Test, Events, PRJ Test</a:t>
+            </a:r>
+          </a:p>
+        </p:txBody>
+      </p:sp>
+      <p:sp>
+        <p:nvSpPr>
+          <p:cNvPr id="4" name="Slide Number Placeholder 3"/>
+          <p:cNvSpPr>
+            <a:spLocks noGrp="1"/>
+          </p:cNvSpPr>
+          <p:nvPr>
+            <p:ph type="sldNum" sz="quarter" idx="5"/>
+          </p:nvPr>
+        </p:nvSpPr>
+        <p:spPr/>
+        <p:txBody>
+          <a:bodyPr/>
+          <a:lstStyle/>
+          <a:p>
+            <a:fld id="{895FF055-5A44-4782-94B0-07A3C9756D2A}" type="slidenum">
+              <a:rPr lang="en-US" smtClean="0"/>
+              <a:t>13</a:t>
+            </a:fld>
+            <a:endParaRPr lang="en-US"/>
+          </a:p>
+        </p:txBody>
+      </p:sp>
+    </p:spTree>
+    <p:extLst>
+      <p:ext uri="{BB962C8B-B14F-4D97-AF65-F5344CB8AC3E}">
+        <p14:creationId xmlns:p14="http://schemas.microsoft.com/office/powerpoint/2010/main" val="2476560461"/>
+      </p:ext>
+    </p:extLst>
+  </p:cSld>
+  <p:clrMapOvr>
+    <a:masterClrMapping/>
+  </p:clrMapOvr>
+</p:notes>
+</file>
+
+<file path=ppt/notesSlides/notesSlide6.xml><?xml version="1.0" encoding="utf-8"?>
+<p:notes xmlns:a="http://schemas.openxmlformats.org/drawingml/2006/main" xmlns:r="http://schemas.openxmlformats.org/officeDocument/2006/relationships" xmlns:p="http://schemas.openxmlformats.org/presentationml/2006/main">
+  <p:cSld>
+    <p:spTree>
+      <p:nvGrpSpPr>
+        <p:cNvPr id="1" name=""/>
+        <p:cNvGrpSpPr/>
+        <p:nvPr/>
+      </p:nvGrpSpPr>
+      <p:grpSpPr>
+        <a:xfrm>
+          <a:off x="0" y="0"/>
+          <a:ext cx="0" cy="0"/>
+          <a:chOff x="0" y="0"/>
+          <a:chExt cx="0" cy="0"/>
+        </a:xfrm>
+      </p:grpSpPr>
+      <p:sp>
+        <p:nvSpPr>
+          <p:cNvPr id="2" name="Slide Image Placeholder 1"/>
+          <p:cNvSpPr>
+            <a:spLocks noGrp="1" noRot="1" noChangeAspect="1"/>
+          </p:cNvSpPr>
+          <p:nvPr>
+            <p:ph type="sldImg"/>
+          </p:nvPr>
+        </p:nvSpPr>
+        <p:spPr/>
+      </p:sp>
+      <p:sp>
+        <p:nvSpPr>
+          <p:cNvPr id="3" name="Notes Placeholder 2"/>
+          <p:cNvSpPr>
+            <a:spLocks noGrp="1"/>
+          </p:cNvSpPr>
+          <p:nvPr>
+            <p:ph type="body" idx="1"/>
+          </p:nvPr>
+        </p:nvSpPr>
+        <p:spPr/>
+        <p:txBody>
+          <a:bodyPr/>
+          <a:lstStyle/>
+          <a:p>
+            <a:r>
+              <a:rPr lang="en-US" dirty="0"/>
+              <a:t>Can use complex structures on both read and write side, the latter e.g. to keep an old database while migrating to cqrs</a:t>
+            </a:r>
+          </a:p>
+          <a:p>
+            <a:r>
+              <a:rPr lang="en-US" dirty="0"/>
+              <a:t>There will be an API like https://host/api/create/cruise, https://host/api/create/room https://host/api/rooms/{tripId}</a:t>
+            </a:r>
+          </a:p>
+        </p:txBody>
+      </p:sp>
+      <p:sp>
+        <p:nvSpPr>
+          <p:cNvPr id="4" name="Slide Number Placeholder 3"/>
+          <p:cNvSpPr>
+            <a:spLocks noGrp="1"/>
+          </p:cNvSpPr>
+          <p:nvPr>
+            <p:ph type="sldNum" sz="quarter" idx="5"/>
+          </p:nvPr>
+        </p:nvSpPr>
+        <p:spPr/>
+        <p:txBody>
+          <a:bodyPr/>
+          <a:lstStyle/>
+          <a:p>
+            <a:fld id="{895FF055-5A44-4782-94B0-07A3C9756D2A}" type="slidenum">
+              <a:rPr lang="en-US" smtClean="0"/>
+              <a:t>14</a:t>
+            </a:fld>
+            <a:endParaRPr lang="en-US"/>
+          </a:p>
+        </p:txBody>
+      </p:sp>
+    </p:spTree>
+    <p:extLst>
+      <p:ext uri="{BB962C8B-B14F-4D97-AF65-F5344CB8AC3E}">
+        <p14:creationId xmlns:p14="http://schemas.microsoft.com/office/powerpoint/2010/main" val="544663143"/>
+      </p:ext>
+    </p:extLst>
+  </p:cSld>
+  <p:clrMapOvr>
+    <a:masterClrMapping/>
+  </p:clrMapOvr>
+</p:notes>
+</file>
+
+<file path=ppt/notesSlides/notesSlide7.xml><?xml version="1.0" encoding="utf-8"?>
+<p:notes xmlns:a="http://schemas.openxmlformats.org/drawingml/2006/main" xmlns:r="http://schemas.openxmlformats.org/officeDocument/2006/relationships" xmlns:p="http://schemas.openxmlformats.org/presentationml/2006/main">
+  <p:cSld>
+    <p:spTree>
+      <p:nvGrpSpPr>
+        <p:cNvPr id="1" name=""/>
+        <p:cNvGrpSpPr/>
+        <p:nvPr/>
+      </p:nvGrpSpPr>
+      <p:grpSpPr>
+        <a:xfrm>
+          <a:off x="0" y="0"/>
+          <a:ext cx="0" cy="0"/>
+          <a:chOff x="0" y="0"/>
+          <a:chExt cx="0" cy="0"/>
+        </a:xfrm>
+      </p:grpSpPr>
+      <p:sp>
+        <p:nvSpPr>
+          <p:cNvPr id="2" name="Slide Image Placeholder 1"/>
+          <p:cNvSpPr>
+            <a:spLocks noGrp="1" noRot="1" noChangeAspect="1"/>
+          </p:cNvSpPr>
+          <p:nvPr>
+            <p:ph type="sldImg"/>
+          </p:nvPr>
+        </p:nvSpPr>
+        <p:spPr/>
+      </p:sp>
+      <p:sp>
+        <p:nvSpPr>
+          <p:cNvPr id="3" name="Notes Placeholder 2"/>
+          <p:cNvSpPr>
+            <a:spLocks noGrp="1"/>
+          </p:cNvSpPr>
+          <p:nvPr>
+            <p:ph type="body" idx="1"/>
+          </p:nvPr>
+        </p:nvSpPr>
+        <p:spPr/>
+        <p:txBody>
+          <a:bodyPr/>
+          <a:lstStyle/>
+          <a:p>
+            <a:r>
+              <a:rPr lang="en-US" dirty="0"/>
+              <a:t>Commands, CH Source, Exposed and External, Test, only the domain-local customer service is mocked</a:t>
+            </a:r>
+          </a:p>
+        </p:txBody>
+      </p:sp>
+      <p:sp>
+        <p:nvSpPr>
+          <p:cNvPr id="4" name="Slide Number Placeholder 3"/>
+          <p:cNvSpPr>
+            <a:spLocks noGrp="1"/>
+          </p:cNvSpPr>
+          <p:nvPr>
+            <p:ph type="sldNum" sz="quarter" idx="5"/>
+          </p:nvPr>
+        </p:nvSpPr>
+        <p:spPr/>
+        <p:txBody>
+          <a:bodyPr/>
+          <a:lstStyle/>
+          <a:p>
+            <a:fld id="{895FF055-5A44-4782-94B0-07A3C9756D2A}" type="slidenum">
+              <a:rPr lang="en-US" smtClean="0"/>
+              <a:t>15</a:t>
+            </a:fld>
+            <a:endParaRPr lang="en-US"/>
+          </a:p>
+        </p:txBody>
+      </p:sp>
+    </p:spTree>
+    <p:extLst>
+      <p:ext uri="{BB962C8B-B14F-4D97-AF65-F5344CB8AC3E}">
+        <p14:creationId xmlns:p14="http://schemas.microsoft.com/office/powerpoint/2010/main" val="1765383261"/>
+      </p:ext>
+    </p:extLst>
+  </p:cSld>
+  <p:clrMapOvr>
+    <a:masterClrMapping/>
+  </p:clrMapOvr>
+</p:notes>
+</file>
+
+<file path=ppt/notesSlides/notesSlide8.xml><?xml version="1.0" encoding="utf-8"?>
+<p:notes xmlns:a="http://schemas.openxmlformats.org/drawingml/2006/main" xmlns:r="http://schemas.openxmlformats.org/officeDocument/2006/relationships" xmlns:p="http://schemas.openxmlformats.org/presentationml/2006/main">
+  <p:cSld>
+    <p:spTree>
+      <p:nvGrpSpPr>
+        <p:cNvPr id="1" name=""/>
+        <p:cNvGrpSpPr/>
+        <p:nvPr/>
+      </p:nvGrpSpPr>
+      <p:grpSpPr>
+        <a:xfrm>
+          <a:off x="0" y="0"/>
+          <a:ext cx="0" cy="0"/>
+          <a:chOff x="0" y="0"/>
+          <a:chExt cx="0" cy="0"/>
+        </a:xfrm>
+      </p:grpSpPr>
+      <p:sp>
+        <p:nvSpPr>
+          <p:cNvPr id="2" name="Slide Image Placeholder 1"/>
+          <p:cNvSpPr>
+            <a:spLocks noGrp="1" noRot="1" noChangeAspect="1"/>
+          </p:cNvSpPr>
+          <p:nvPr>
+            <p:ph type="sldImg"/>
+          </p:nvPr>
+        </p:nvSpPr>
+        <p:spPr/>
+      </p:sp>
+      <p:sp>
+        <p:nvSpPr>
+          <p:cNvPr id="3" name="Notes Placeholder 2"/>
+          <p:cNvSpPr>
+            <a:spLocks noGrp="1"/>
+          </p:cNvSpPr>
+          <p:nvPr>
+            <p:ph type="body" idx="1"/>
+          </p:nvPr>
+        </p:nvSpPr>
+        <p:spPr/>
+        <p:txBody>
+          <a:bodyPr/>
+          <a:lstStyle/>
+          <a:p>
+            <a:r>
+              <a:rPr lang="en-US" dirty="0"/>
+              <a:t>Warehouse</a:t>
+            </a:r>
+            <a:r>
+              <a:rPr lang="en-US"/>
+              <a:t>, PayPal, Commands</a:t>
+            </a:r>
+            <a:endParaRPr lang="en-US" dirty="0"/>
+          </a:p>
+        </p:txBody>
+      </p:sp>
+      <p:sp>
+        <p:nvSpPr>
+          <p:cNvPr id="4" name="Slide Number Placeholder 3"/>
+          <p:cNvSpPr>
+            <a:spLocks noGrp="1"/>
+          </p:cNvSpPr>
+          <p:nvPr>
+            <p:ph type="sldNum" sz="quarter" idx="5"/>
+          </p:nvPr>
+        </p:nvSpPr>
+        <p:spPr/>
+        <p:txBody>
+          <a:bodyPr/>
+          <a:lstStyle/>
+          <a:p>
+            <a:fld id="{895FF055-5A44-4782-94B0-07A3C9756D2A}" type="slidenum">
+              <a:rPr lang="en-US" smtClean="0"/>
+              <a:t>17</a:t>
+            </a:fld>
+            <a:endParaRPr lang="en-US"/>
+          </a:p>
+        </p:txBody>
+      </p:sp>
+    </p:spTree>
+    <p:extLst>
+      <p:ext uri="{BB962C8B-B14F-4D97-AF65-F5344CB8AC3E}">
+        <p14:creationId xmlns:p14="http://schemas.microsoft.com/office/powerpoint/2010/main" val="801425303"/>
+      </p:ext>
+    </p:extLst>
+  </p:cSld>
+  <p:clrMapOvr>
+    <a:masterClrMapping/>
+  </p:clrMapOvr>
+</p:notes>
+</file>
+
+<file path=ppt/notesSlides/notesSlide9.xml><?xml version="1.0" encoding="utf-8"?>
+<p:notes xmlns:a="http://schemas.openxmlformats.org/drawingml/2006/main" xmlns:r="http://schemas.openxmlformats.org/officeDocument/2006/relationships" xmlns:p="http://schemas.openxmlformats.org/presentationml/2006/main">
+  <p:cSld>
+    <p:spTree>
+      <p:nvGrpSpPr>
+        <p:cNvPr id="1" name=""/>
+        <p:cNvGrpSpPr/>
+        <p:nvPr/>
+      </p:nvGrpSpPr>
+      <p:grpSpPr>
+        <a:xfrm>
+          <a:off x="0" y="0"/>
+          <a:ext cx="0" cy="0"/>
+          <a:chOff x="0" y="0"/>
+          <a:chExt cx="0" cy="0"/>
+        </a:xfrm>
+      </p:grpSpPr>
+      <p:sp>
+        <p:nvSpPr>
+          <p:cNvPr id="2" name="Slide Image Placeholder 1"/>
+          <p:cNvSpPr>
+            <a:spLocks noGrp="1" noRot="1" noChangeAspect="1"/>
+          </p:cNvSpPr>
+          <p:nvPr>
+            <p:ph type="sldImg"/>
+          </p:nvPr>
+        </p:nvSpPr>
+        <p:spPr/>
+      </p:sp>
+      <p:sp>
+        <p:nvSpPr>
+          <p:cNvPr id="3" name="Notes Placeholder 2"/>
+          <p:cNvSpPr>
+            <a:spLocks noGrp="1"/>
+          </p:cNvSpPr>
+          <p:nvPr>
+            <p:ph type="body" idx="1"/>
+          </p:nvPr>
+        </p:nvSpPr>
+        <p:spPr/>
+        <p:txBody>
+          <a:bodyPr/>
+          <a:lstStyle/>
+          <a:p>
+            <a:r>
+              <a:rPr lang="en-US" dirty="0"/>
               <a:t>Basic: https://docs.particular.net/tutorials/quickstart/</a:t>
             </a:r>
           </a:p>
@@ -743,10 +1290,9 @@
           </a:p>
           <a:p>
             <a:r>
-              <a:rPr lang="en-US"/>
+              <a:rPr lang="en-US" dirty="0"/>
               <a:t>Rabbit delayed messages: https://www.cloudamqp.com/docs/delayed-messages.html</a:t>
             </a:r>
-            <a:endParaRPr lang="en-US" dirty="0"/>
           </a:p>
         </p:txBody>
       </p:sp>
@@ -1239,7 +1785,7 @@
           <a:p>
             <a:fld id="{F7AFFB9B-9FB8-469E-96F9-4D32314110B6}" type="datetimeFigureOut">
               <a:rPr lang="en-US" dirty="0"/>
-              <a:t>10/28/2019</a:t>
+              <a:t>10/29/2019</a:t>
             </a:fld>
             <a:endParaRPr lang="en-US" dirty="0"/>
           </a:p>
@@ -1567,7 +2113,7 @@
           <a:p>
             <a:fld id="{341D2AC3-6A0B-4169-B1EA-E3AE8B351BDD}" type="datetimeFigureOut">
               <a:rPr lang="en-US" dirty="0"/>
-              <a:t>10/28/2019</a:t>
+              <a:t>10/29/2019</a:t>
             </a:fld>
             <a:endParaRPr lang="en-US" dirty="0"/>
           </a:p>
@@ -1758,7 +2304,7 @@
           <a:p>
             <a:fld id="{DD4B9363-8B87-41B7-9F8E-64519CBB8F34}" type="datetimeFigureOut">
               <a:rPr lang="en-US" dirty="0"/>
-              <a:t>10/28/2019</a:t>
+              <a:t>10/29/2019</a:t>
             </a:fld>
             <a:endParaRPr lang="en-US" dirty="0"/>
           </a:p>
@@ -2023,7 +2569,7 @@
           <a:p>
             <a:fld id="{EAEF5746-5284-4951-9F37-7AE924EDBCB7}" type="datetimeFigureOut">
               <a:rPr lang="en-US" dirty="0"/>
-              <a:t>10/28/2019</a:t>
+              <a:t>10/29/2019</a:t>
             </a:fld>
             <a:endParaRPr lang="en-US" dirty="0"/>
           </a:p>
@@ -2446,7 +2992,7 @@
           <a:p>
             <a:fld id="{02398B29-7265-4A65-A2A4-6703C057B7C1}" type="datetimeFigureOut">
               <a:rPr lang="en-US" dirty="0"/>
-              <a:t>10/28/2019</a:t>
+              <a:t>10/29/2019</a:t>
             </a:fld>
             <a:endParaRPr lang="en-US" dirty="0"/>
           </a:p>
@@ -2991,7 +3537,7 @@
           <a:p>
             <a:fld id="{28FBA082-94DF-4C4B-A041-6624924AB0A8}" type="datetimeFigureOut">
               <a:rPr lang="en-US" dirty="0"/>
-              <a:t>10/28/2019</a:t>
+              <a:t>10/29/2019</a:t>
             </a:fld>
             <a:endParaRPr lang="en-US" dirty="0"/>
           </a:p>
@@ -3776,7 +4322,7 @@
           <a:p>
             <a:fld id="{B27686C4-3AB5-4E0C-86CA-FB108C350AA9}" type="datetimeFigureOut">
               <a:rPr lang="en-US" dirty="0"/>
-              <a:t>10/28/2019</a:t>
+              <a:t>10/29/2019</a:t>
             </a:fld>
             <a:endParaRPr lang="en-US" dirty="0"/>
           </a:p>
@@ -3950,7 +4496,7 @@
           <a:p>
             <a:fld id="{49FF1211-4E0C-4AB3-B04F-585959BDAFE8}" type="datetimeFigureOut">
               <a:rPr lang="en-US" dirty="0"/>
-              <a:t>10/28/2019</a:t>
+              <a:t>10/29/2019</a:t>
             </a:fld>
             <a:endParaRPr lang="en-US" dirty="0"/>
           </a:p>
@@ -4129,7 +4675,7 @@
           <a:p>
             <a:fld id="{28BDECAF-D3BE-4069-9C78-642ECCD01477}" type="datetimeFigureOut">
               <a:rPr lang="en-US" dirty="0"/>
-              <a:t>10/28/2019</a:t>
+              <a:t>10/29/2019</a:t>
             </a:fld>
             <a:endParaRPr lang="en-US" dirty="0"/>
           </a:p>
@@ -4299,7 +4845,7 @@
           <a:p>
             <a:fld id="{8EFBDC27-E420-4878-9EE6-7B9656D6442A}" type="datetimeFigureOut">
               <a:rPr lang="en-US" dirty="0"/>
-              <a:t>10/28/2019</a:t>
+              <a:t>10/29/2019</a:t>
             </a:fld>
             <a:endParaRPr lang="en-US" dirty="0"/>
           </a:p>
@@ -4544,7 +5090,7 @@
           <a:p>
             <a:fld id="{0F7F47CF-67C9-420C-80A5-E2069FF0C2DF}" type="datetimeFigureOut">
               <a:rPr lang="en-US" dirty="0"/>
-              <a:t>10/28/2019</a:t>
+              <a:t>10/29/2019</a:t>
             </a:fld>
             <a:endParaRPr lang="en-US" dirty="0"/>
           </a:p>
@@ -4776,7 +5322,7 @@
           <a:p>
             <a:fld id="{AE22DC73-F065-42F5-A9F2-D90B2E42A0B3}" type="datetimeFigureOut">
               <a:rPr lang="en-US" dirty="0"/>
-              <a:t>10/28/2019</a:t>
+              <a:t>10/29/2019</a:t>
             </a:fld>
             <a:endParaRPr lang="en-US" dirty="0"/>
           </a:p>
@@ -5156,7 +5702,7 @@
           <a:p>
             <a:fld id="{76BEA702-9B29-41CC-9BCC-3DF8A0D379FE}" type="datetimeFigureOut">
               <a:rPr lang="en-US" dirty="0"/>
-              <a:t>10/28/2019</a:t>
+              <a:t>10/29/2019</a:t>
             </a:fld>
             <a:endParaRPr lang="en-US" dirty="0"/>
           </a:p>
@@ -5269,7 +5815,7 @@
           <a:p>
             <a:fld id="{097649AC-CB8F-4FF1-9A34-5861C74DD0A7}" type="datetimeFigureOut">
               <a:rPr lang="en-US" dirty="0"/>
-              <a:t>10/28/2019</a:t>
+              <a:t>10/29/2019</a:t>
             </a:fld>
             <a:endParaRPr lang="en-US" dirty="0"/>
           </a:p>
@@ -5359,7 +5905,7 @@
           <a:p>
             <a:fld id="{3EC5CECA-2D3A-4680-9B49-752200DE467C}" type="datetimeFigureOut">
               <a:rPr lang="en-US" dirty="0"/>
-              <a:t>10/28/2019</a:t>
+              <a:t>10/29/2019</a:t>
             </a:fld>
             <a:endParaRPr lang="en-US" dirty="0"/>
           </a:p>
@@ -5607,7 +6153,7 @@
           <a:p>
             <a:fld id="{50C3BFE2-83B7-4B0A-B9D3-AB28331082B3}" type="datetimeFigureOut">
               <a:rPr lang="en-US" dirty="0"/>
-              <a:t>10/28/2019</a:t>
+              <a:t>10/29/2019</a:t>
             </a:fld>
             <a:endParaRPr lang="en-US" dirty="0"/>
           </a:p>
@@ -5871,7 +6417,7 @@
           <a:p>
             <a:fld id="{12EF78E3-FDA3-4D28-AAA2-0B81F349A39D}" type="datetimeFigureOut">
               <a:rPr lang="en-US" dirty="0"/>
-              <a:t>10/28/2019</a:t>
+              <a:t>10/29/2019</a:t>
             </a:fld>
             <a:endParaRPr lang="en-US" dirty="0"/>
           </a:p>
@@ -6269,7 +6815,7 @@
           <a:p>
             <a:fld id="{C35BB1C6-BF8F-4481-8AB2-603A1C8A906A}" type="datetimeFigureOut">
               <a:rPr lang="en-US" dirty="0"/>
-              <a:t>10/28/2019</a:t>
+              <a:t>10/29/2019</a:t>
             </a:fld>
             <a:endParaRPr lang="en-US" dirty="0"/>
           </a:p>
@@ -6884,7 +7430,7 @@
           </p:nvPr>
         </p:nvPicPr>
         <p:blipFill>
-          <a:blip r:embed="rId2"/>
+          <a:blip r:embed="rId3"/>
           <a:stretch>
             <a:fillRect/>
           </a:stretch>
@@ -7198,7 +7744,7 @@
           <a:p>
             <a:r>
               <a:rPr lang="en-US" dirty="0"/>
-              <a:t>Every context is responsible for its part of the transaction</a:t>
+              <a:t>Every domain is responsible for its part of the transaction</a:t>
             </a:r>
           </a:p>
           <a:p>
@@ -7227,7 +7773,7 @@
       <p:pic>
         <p:nvPicPr>
           <p:cNvPr id="3077" name="Picture 5" descr="Image result for schedule">
-            <a:hlinkClick r:id="rId2"/>
+            <a:hlinkClick r:id="rId3"/>
             <a:extLst>
               <a:ext uri="{FF2B5EF4-FFF2-40B4-BE49-F238E27FC236}">
                 <a16:creationId xmlns:a16="http://schemas.microsoft.com/office/drawing/2014/main" id="{D640B487-3A4E-4810-B2F6-F8848EB2C3C2}"/>
@@ -7242,7 +7788,7 @@
           </p:nvPr>
         </p:nvPicPr>
         <p:blipFill>
-          <a:blip r:embed="rId3">
+          <a:blip r:embed="rId4">
             <a:extLst>
               <a:ext uri="{28A0092B-C50C-407E-A947-70E740481C1C}">
                 <a14:useLocalDpi xmlns:a14="http://schemas.microsoft.com/office/drawing/2010/main" val="0"/>
@@ -7293,7 +7839,7 @@
     <p:bg>
       <p:bgPr>
         <a:blipFill dpi="0" rotWithShape="1">
-          <a:blip r:embed="rId2">
+          <a:blip r:embed="rId3">
             <a:lum/>
           </a:blip>
           <a:srcRect/>
@@ -7333,7 +7879,7 @@
           <p:nvPr/>
         </p:nvPicPr>
         <p:blipFill>
-          <a:blip r:embed="rId3"/>
+          <a:blip r:embed="rId4"/>
           <a:stretch>
             <a:fillRect/>
           </a:stretch>
@@ -7682,7 +8228,7 @@
           <p:nvPr/>
         </p:nvPicPr>
         <p:blipFill>
-          <a:blip r:embed="rId2"/>
+          <a:blip r:embed="rId3"/>
           <a:stretch>
             <a:fillRect/>
           </a:stretch>
@@ -7914,7 +8460,13 @@
           <a:p>
             <a:r>
               <a:rPr lang="en-US" dirty="0"/>
-              <a:t>Every transaction-controlled context has</a:t>
+              <a:t>Or Sagas</a:t>
+            </a:r>
+          </a:p>
+          <a:p>
+            <a:r>
+              <a:rPr lang="en-US" dirty="0"/>
+              <a:t>Every transaction-controlled domain has</a:t>
             </a:r>
           </a:p>
           <a:p>
@@ -7970,7 +8522,7 @@
           <a:p>
             <a:r>
               <a:rPr lang="en-US" dirty="0"/>
-              <a:t>The coordinator, often reach the dignity of a separate context</a:t>
+              <a:t>The coordinator, often reach the dignity of a separate domain</a:t>
             </a:r>
           </a:p>
           <a:p>
@@ -9285,6 +9837,12 @@
           <a:p>
             <a:r>
               <a:rPr lang="en-US" dirty="0"/>
+              <a:t>Actor separated from the domain in a DDD way</a:t>
+            </a:r>
+          </a:p>
+          <a:p>
+            <a:r>
+              <a:rPr lang="en-US" dirty="0"/>
               <a:t>Every interaction is managed through messages – commands and events within the cqrs pattern</a:t>
             </a:r>
           </a:p>
@@ -11795,7 +12353,7 @@
             <a:pPr lvl="1"/>
             <a:r>
               <a:rPr lang="en-US" dirty="0"/>
-              <a:t>Projections implementations</a:t>
+              <a:t>Query service and event handlers implementations</a:t>
             </a:r>
           </a:p>
           <a:p>
@@ -11823,7 +12381,7 @@
             <a:pPr lvl="1"/>
             <a:r>
               <a:rPr lang="en-US" dirty="0"/>
-              <a:t>Layer to isolate services in ZZZ.EXPOSED</a:t>
+              <a:t>Layer to isolate services in ZZZ.EXPOSED as a proxy</a:t>
             </a:r>
           </a:p>
         </p:txBody>
@@ -12104,7 +12662,7 @@
       <p:pic>
         <p:nvPicPr>
           <p:cNvPr id="1027" name="Picture 3" descr="Image result for car transmission">
-            <a:hlinkClick r:id="rId2"/>
+            <a:hlinkClick r:id="rId3"/>
             <a:extLst>
               <a:ext uri="{FF2B5EF4-FFF2-40B4-BE49-F238E27FC236}">
                 <a16:creationId xmlns:a16="http://schemas.microsoft.com/office/drawing/2014/main" id="{264926C8-AFD1-4AFD-9D84-4F165D791799}"/>
@@ -12119,7 +12677,7 @@
           </p:nvPr>
         </p:nvPicPr>
         <p:blipFill>
-          <a:blip r:embed="rId3">
+          <a:blip r:embed="rId4">
             <a:extLst>
               <a:ext uri="{28A0092B-C50C-407E-A947-70E740481C1C}">
                 <a14:useLocalDpi xmlns:a14="http://schemas.microsoft.com/office/drawing/2010/main" val="0"/>
@@ -12263,7 +12821,7 @@
           <a:p>
             <a:r>
               <a:rPr lang="en-US" dirty="0"/>
-              <a:t>Contains all the data needed by the command</a:t>
+              <a:t>Contains all the data needed to understand the fact happened</a:t>
             </a:r>
           </a:p>
         </p:txBody>

</xml_diff>